<commit_message>
#3 Add support for sns and refactor
</commit_message>
<xml_diff>
--- a/images/aws_architecture.pptx
+++ b/images/aws_architecture.pptx
@@ -259,7 +259,7 @@
           <a:p>
             <a:fld id="{42AC6DE8-5C89-714B-A3A1-F7E061897443}" type="datetimeFigureOut">
               <a:rPr lang="en-US" smtClean="0"/>
-              <a:t>9/7/20</a:t>
+              <a:t>9/13/20</a:t>
             </a:fld>
             <a:endParaRPr lang="en-US"/>
           </a:p>
@@ -457,7 +457,7 @@
           <a:p>
             <a:fld id="{42AC6DE8-5C89-714B-A3A1-F7E061897443}" type="datetimeFigureOut">
               <a:rPr lang="en-US" smtClean="0"/>
-              <a:t>9/7/20</a:t>
+              <a:t>9/13/20</a:t>
             </a:fld>
             <a:endParaRPr lang="en-US"/>
           </a:p>
@@ -665,7 +665,7 @@
           <a:p>
             <a:fld id="{42AC6DE8-5C89-714B-A3A1-F7E061897443}" type="datetimeFigureOut">
               <a:rPr lang="en-US" smtClean="0"/>
-              <a:t>9/7/20</a:t>
+              <a:t>9/13/20</a:t>
             </a:fld>
             <a:endParaRPr lang="en-US"/>
           </a:p>
@@ -863,7 +863,7 @@
           <a:p>
             <a:fld id="{42AC6DE8-5C89-714B-A3A1-F7E061897443}" type="datetimeFigureOut">
               <a:rPr lang="en-US" smtClean="0"/>
-              <a:t>9/7/20</a:t>
+              <a:t>9/13/20</a:t>
             </a:fld>
             <a:endParaRPr lang="en-US"/>
           </a:p>
@@ -1138,7 +1138,7 @@
           <a:p>
             <a:fld id="{42AC6DE8-5C89-714B-A3A1-F7E061897443}" type="datetimeFigureOut">
               <a:rPr lang="en-US" smtClean="0"/>
-              <a:t>9/7/20</a:t>
+              <a:t>9/13/20</a:t>
             </a:fld>
             <a:endParaRPr lang="en-US"/>
           </a:p>
@@ -1403,7 +1403,7 @@
           <a:p>
             <a:fld id="{42AC6DE8-5C89-714B-A3A1-F7E061897443}" type="datetimeFigureOut">
               <a:rPr lang="en-US" smtClean="0"/>
-              <a:t>9/7/20</a:t>
+              <a:t>9/13/20</a:t>
             </a:fld>
             <a:endParaRPr lang="en-US"/>
           </a:p>
@@ -1815,7 +1815,7 @@
           <a:p>
             <a:fld id="{42AC6DE8-5C89-714B-A3A1-F7E061897443}" type="datetimeFigureOut">
               <a:rPr lang="en-US" smtClean="0"/>
-              <a:t>9/7/20</a:t>
+              <a:t>9/13/20</a:t>
             </a:fld>
             <a:endParaRPr lang="en-US"/>
           </a:p>
@@ -1956,7 +1956,7 @@
           <a:p>
             <a:fld id="{42AC6DE8-5C89-714B-A3A1-F7E061897443}" type="datetimeFigureOut">
               <a:rPr lang="en-US" smtClean="0"/>
-              <a:t>9/7/20</a:t>
+              <a:t>9/13/20</a:t>
             </a:fld>
             <a:endParaRPr lang="en-US"/>
           </a:p>
@@ -2069,7 +2069,7 @@
           <a:p>
             <a:fld id="{42AC6DE8-5C89-714B-A3A1-F7E061897443}" type="datetimeFigureOut">
               <a:rPr lang="en-US" smtClean="0"/>
-              <a:t>9/7/20</a:t>
+              <a:t>9/13/20</a:t>
             </a:fld>
             <a:endParaRPr lang="en-US"/>
           </a:p>
@@ -2380,7 +2380,7 @@
           <a:p>
             <a:fld id="{42AC6DE8-5C89-714B-A3A1-F7E061897443}" type="datetimeFigureOut">
               <a:rPr lang="en-US" smtClean="0"/>
-              <a:t>9/7/20</a:t>
+              <a:t>9/13/20</a:t>
             </a:fld>
             <a:endParaRPr lang="en-US"/>
           </a:p>
@@ -2668,7 +2668,7 @@
           <a:p>
             <a:fld id="{42AC6DE8-5C89-714B-A3A1-F7E061897443}" type="datetimeFigureOut">
               <a:rPr lang="en-US" smtClean="0"/>
-              <a:t>9/7/20</a:t>
+              <a:t>9/13/20</a:t>
             </a:fld>
             <a:endParaRPr lang="en-US"/>
           </a:p>
@@ -2909,7 +2909,7 @@
           <a:p>
             <a:fld id="{42AC6DE8-5C89-714B-A3A1-F7E061897443}" type="datetimeFigureOut">
               <a:rPr lang="en-US" smtClean="0"/>
-              <a:t>9/7/20</a:t>
+              <a:t>9/13/20</a:t>
             </a:fld>
             <a:endParaRPr lang="en-US"/>
           </a:p>
@@ -3340,8 +3340,8 @@
         </p:nvSpPr>
         <p:spPr>
           <a:xfrm>
-            <a:off x="3650426" y="427453"/>
-            <a:ext cx="7958478" cy="6122434"/>
+            <a:off x="3319670" y="427453"/>
+            <a:ext cx="8647039" cy="6122434"/>
           </a:xfrm>
           <a:prstGeom prst="rect">
             <a:avLst/>
@@ -3418,7 +3418,7 @@
         </p:blipFill>
         <p:spPr>
           <a:xfrm>
-            <a:off x="3650425" y="427453"/>
+            <a:off x="3303584" y="427453"/>
             <a:ext cx="330200" cy="330200"/>
           </a:xfrm>
           <a:prstGeom prst="rect">
@@ -3454,7 +3454,7 @@
         </p:blipFill>
         <p:spPr>
           <a:xfrm>
-            <a:off x="5290651" y="2841548"/>
+            <a:off x="5648456" y="2841548"/>
             <a:ext cx="711200" cy="711200"/>
           </a:xfrm>
           <a:prstGeom prst="rect">
@@ -3476,7 +3476,7 @@
         </p:nvSpPr>
         <p:spPr>
           <a:xfrm>
-            <a:off x="4892975" y="3582890"/>
+            <a:off x="5250780" y="3582890"/>
             <a:ext cx="1506552" cy="307777"/>
           </a:xfrm>
           <a:prstGeom prst="rect">
@@ -3514,7 +3514,7 @@
         </p:nvSpPr>
         <p:spPr>
           <a:xfrm>
-            <a:off x="9353384" y="3582890"/>
+            <a:off x="9711189" y="3582890"/>
             <a:ext cx="2217871" cy="307777"/>
           </a:xfrm>
           <a:prstGeom prst="rect">
@@ -3581,7 +3581,7 @@
         </p:blipFill>
         <p:spPr>
           <a:xfrm>
-            <a:off x="10106719" y="2871690"/>
+            <a:off x="10464524" y="2871690"/>
             <a:ext cx="711200" cy="711200"/>
           </a:xfrm>
           <a:prstGeom prst="rect">
@@ -3603,7 +3603,7 @@
         </p:nvSpPr>
         <p:spPr>
           <a:xfrm>
-            <a:off x="8102047" y="3582890"/>
+            <a:off x="8459852" y="3582890"/>
             <a:ext cx="1371158" cy="307777"/>
           </a:xfrm>
           <a:prstGeom prst="rect">
@@ -3657,7 +3657,7 @@
         </p:blipFill>
         <p:spPr>
           <a:xfrm>
-            <a:off x="8575955" y="2992340"/>
+            <a:off x="8933760" y="2992340"/>
             <a:ext cx="469900" cy="469900"/>
           </a:xfrm>
           <a:prstGeom prst="rect">
@@ -3679,7 +3679,7 @@
         </p:nvSpPr>
         <p:spPr>
           <a:xfrm>
-            <a:off x="4537316" y="5316351"/>
+            <a:off x="4895121" y="5316351"/>
             <a:ext cx="2217871" cy="307777"/>
           </a:xfrm>
           <a:prstGeom prst="rect">
@@ -3733,7 +3733,7 @@
         </p:blipFill>
         <p:spPr>
           <a:xfrm>
-            <a:off x="5290651" y="4605151"/>
+            <a:off x="5648456" y="4605151"/>
             <a:ext cx="711200" cy="711200"/>
           </a:xfrm>
           <a:prstGeom prst="rect">
@@ -3755,7 +3755,7 @@
         </p:nvSpPr>
         <p:spPr>
           <a:xfrm>
-            <a:off x="6775853" y="5316351"/>
+            <a:off x="7133658" y="5316351"/>
             <a:ext cx="2301904" cy="307777"/>
           </a:xfrm>
           <a:prstGeom prst="rect">
@@ -3807,7 +3807,7 @@
         </p:blipFill>
         <p:spPr>
           <a:xfrm>
-            <a:off x="7571205" y="4605151"/>
+            <a:off x="7929010" y="4605151"/>
             <a:ext cx="711200" cy="711200"/>
           </a:xfrm>
           <a:prstGeom prst="rect">
@@ -3829,7 +3829,7 @@
         </p:nvSpPr>
         <p:spPr>
           <a:xfrm>
-            <a:off x="9311367" y="1644366"/>
+            <a:off x="9669172" y="1644366"/>
             <a:ext cx="2301904" cy="307777"/>
           </a:xfrm>
           <a:prstGeom prst="rect">
@@ -3881,7 +3881,7 @@
         </p:blipFill>
         <p:spPr>
           <a:xfrm>
-            <a:off x="10106719" y="935388"/>
+            <a:off x="10464524" y="935388"/>
             <a:ext cx="711200" cy="711200"/>
           </a:xfrm>
           <a:prstGeom prst="rect">
@@ -3907,7 +3907,7 @@
         </p:nvCxnSpPr>
         <p:spPr>
           <a:xfrm flipH="1">
-            <a:off x="9045855" y="3227290"/>
+            <a:off x="9403660" y="3227290"/>
             <a:ext cx="1060864" cy="0"/>
           </a:xfrm>
           <a:prstGeom prst="straightConnector1">
@@ -3954,7 +3954,7 @@
         </p:nvCxnSpPr>
         <p:spPr>
           <a:xfrm flipH="1" flipV="1">
-            <a:off x="6001851" y="3197148"/>
+            <a:off x="6359656" y="3197148"/>
             <a:ext cx="2574104" cy="30142"/>
           </a:xfrm>
           <a:prstGeom prst="straightConnector1">
@@ -3997,7 +3997,7 @@
         </p:nvSpPr>
         <p:spPr>
           <a:xfrm rot="5400000" flipH="1" flipV="1">
-            <a:off x="7050257" y="-214921"/>
+            <a:off x="7408062" y="-214921"/>
             <a:ext cx="1527521" cy="4585402"/>
           </a:xfrm>
           <a:custGeom>
@@ -4138,7 +4138,7 @@
         </p:nvSpPr>
         <p:spPr>
           <a:xfrm>
-            <a:off x="6736082" y="2332859"/>
+            <a:off x="7093887" y="2332859"/>
             <a:ext cx="2301904" cy="523220"/>
           </a:xfrm>
           <a:prstGeom prst="rect">
@@ -4190,7 +4190,7 @@
         </p:blipFill>
         <p:spPr>
           <a:xfrm>
-            <a:off x="7571205" y="1598846"/>
+            <a:off x="7929010" y="1598846"/>
             <a:ext cx="711200" cy="711200"/>
           </a:xfrm>
           <a:prstGeom prst="rect">
@@ -4212,7 +4212,7 @@
         </p:nvSpPr>
         <p:spPr>
           <a:xfrm rot="5400000" flipH="1" flipV="1">
-            <a:off x="6230890" y="1501223"/>
+            <a:off x="6588695" y="1501223"/>
             <a:ext cx="899595" cy="1781035"/>
           </a:xfrm>
           <a:custGeom>
@@ -4315,7 +4315,7 @@
         </p:blipFill>
         <p:spPr bwMode="auto">
           <a:xfrm>
-            <a:off x="1200391" y="2640701"/>
+            <a:off x="1001610" y="2640701"/>
             <a:ext cx="1913671" cy="1078124"/>
           </a:xfrm>
           <a:prstGeom prst="rect">
@@ -4351,8 +4351,8 @@
         </p:nvCxnSpPr>
         <p:spPr>
           <a:xfrm flipH="1" flipV="1">
-            <a:off x="3114062" y="3179763"/>
-            <a:ext cx="2176589" cy="17385"/>
+            <a:off x="2915281" y="3179763"/>
+            <a:ext cx="2733175" cy="17385"/>
           </a:xfrm>
           <a:prstGeom prst="straightConnector1">
             <a:avLst/>
@@ -4408,7 +4408,7 @@
         </p:blipFill>
         <p:spPr>
           <a:xfrm flipH="1">
-            <a:off x="431681" y="4639389"/>
+            <a:off x="511192" y="4639389"/>
             <a:ext cx="483586" cy="469900"/>
           </a:xfrm>
           <a:prstGeom prst="rect">
@@ -4430,7 +4430,7 @@
         </p:nvSpPr>
         <p:spPr>
           <a:xfrm>
-            <a:off x="-72544" y="5162923"/>
+            <a:off x="6967" y="5162923"/>
             <a:ext cx="1506552" cy="307777"/>
           </a:xfrm>
           <a:prstGeom prst="rect">
@@ -4466,7 +4466,7 @@
         </p:nvSpPr>
         <p:spPr>
           <a:xfrm rot="5400000" flipH="1" flipV="1">
-            <a:off x="191684" y="3630679"/>
+            <a:off x="271195" y="3630679"/>
             <a:ext cx="1492889" cy="524529"/>
           </a:xfrm>
           <a:custGeom>
@@ -4554,7 +4554,7 @@
         </p:nvSpPr>
         <p:spPr>
           <a:xfrm rot="5400000" flipH="1">
-            <a:off x="6393737" y="3036072"/>
+            <a:off x="6751542" y="3036072"/>
             <a:ext cx="1134822" cy="1920677"/>
           </a:xfrm>
           <a:custGeom>
@@ -4646,7 +4646,7 @@
         </p:nvCxnSpPr>
         <p:spPr>
           <a:xfrm>
-            <a:off x="5646251" y="3890667"/>
+            <a:off x="6004056" y="3890667"/>
             <a:ext cx="0" cy="714484"/>
           </a:xfrm>
           <a:prstGeom prst="straightConnector1">
@@ -4689,7 +4689,7 @@
         </p:nvSpPr>
         <p:spPr>
           <a:xfrm>
-            <a:off x="9364802" y="5316351"/>
+            <a:off x="9722607" y="5316351"/>
             <a:ext cx="2301904" cy="307777"/>
           </a:xfrm>
           <a:prstGeom prst="rect">
@@ -4739,7 +4739,7 @@
         </p:blipFill>
         <p:spPr>
           <a:xfrm>
-            <a:off x="10160154" y="4605151"/>
+            <a:off x="10517959" y="4605151"/>
             <a:ext cx="711200" cy="711200"/>
           </a:xfrm>
           <a:prstGeom prst="rect">
@@ -4747,6 +4747,170 @@
           </a:prstGeom>
         </p:spPr>
       </p:pic>
+      <p:sp>
+        <p:nvSpPr>
+          <p:cNvPr id="34" name="TextBox 33">
+            <a:extLst>
+              <a:ext uri="{FF2B5EF4-FFF2-40B4-BE49-F238E27FC236}">
+                <a16:creationId xmlns:a16="http://schemas.microsoft.com/office/drawing/2014/main" id="{B8E4948A-5EFB-F84B-907D-A79A0F9393B9}"/>
+              </a:ext>
+            </a:extLst>
+          </p:cNvPr>
+          <p:cNvSpPr txBox="1"/>
+          <p:nvPr/>
+        </p:nvSpPr>
+        <p:spPr>
+          <a:xfrm>
+            <a:off x="3351488" y="2291512"/>
+            <a:ext cx="2217871" cy="523220"/>
+          </a:xfrm>
+          <a:prstGeom prst="rect">
+            <a:avLst/>
+          </a:prstGeom>
+          <a:noFill/>
+        </p:spPr>
+        <p:txBody>
+          <a:bodyPr wrap="square" rtlCol="0">
+            <a:spAutoFit/>
+          </a:bodyPr>
+          <a:lstStyle/>
+          <a:p>
+            <a:pPr algn="ctr"/>
+            <a:r>
+              <a:rPr lang="en-US" sz="1400" dirty="0">
+                <a:latin typeface="+mj-lt"/>
+                <a:ea typeface="Amazon Ember" panose="020B0603020204020204" pitchFamily="34" charset="0"/>
+                <a:cs typeface="Amazon Ember" panose="020B0603020204020204" pitchFamily="34" charset="0"/>
+              </a:rPr>
+              <a:t>Amazon Simple Notification Service</a:t>
+            </a:r>
+          </a:p>
+        </p:txBody>
+      </p:sp>
+      <p:pic>
+        <p:nvPicPr>
+          <p:cNvPr id="40" name="Graphic 39">
+            <a:extLst>
+              <a:ext uri="{FF2B5EF4-FFF2-40B4-BE49-F238E27FC236}">
+                <a16:creationId xmlns:a16="http://schemas.microsoft.com/office/drawing/2014/main" id="{F3E9489A-346F-AC4C-98D6-824CAAD7F1D4}"/>
+              </a:ext>
+            </a:extLst>
+          </p:cNvPr>
+          <p:cNvPicPr>
+            <a:picLocks noChangeAspect="1"/>
+          </p:cNvPicPr>
+          <p:nvPr/>
+        </p:nvPicPr>
+        <p:blipFill>
+          <a:blip r:embed="rId23">
+            <a:extLst>
+              <a:ext uri="{96DAC541-7B7A-43D3-8B79-37D633B846F1}">
+                <asvg:svgBlip xmlns:asvg="http://schemas.microsoft.com/office/drawing/2016/SVG/main" r:embed="rId24"/>
+              </a:ext>
+            </a:extLst>
+          </a:blip>
+          <a:stretch>
+            <a:fillRect/>
+          </a:stretch>
+        </p:blipFill>
+        <p:spPr>
+          <a:xfrm>
+            <a:off x="4111015" y="1596543"/>
+            <a:ext cx="711200" cy="711200"/>
+          </a:xfrm>
+          <a:prstGeom prst="rect">
+            <a:avLst/>
+          </a:prstGeom>
+        </p:spPr>
+      </p:pic>
+      <p:sp>
+        <p:nvSpPr>
+          <p:cNvPr id="47" name="Freeform 46">
+            <a:extLst>
+              <a:ext uri="{FF2B5EF4-FFF2-40B4-BE49-F238E27FC236}">
+                <a16:creationId xmlns:a16="http://schemas.microsoft.com/office/drawing/2014/main" id="{5B25CE66-1EFB-0B4F-B331-4A11545960FA}"/>
+              </a:ext>
+            </a:extLst>
+          </p:cNvPr>
+          <p:cNvSpPr/>
+          <p:nvPr/>
+        </p:nvSpPr>
+        <p:spPr>
+          <a:xfrm rot="10800000" flipH="1" flipV="1">
+            <a:off x="4810388" y="1952143"/>
+            <a:ext cx="940563" cy="889396"/>
+          </a:xfrm>
+          <a:custGeom>
+            <a:avLst/>
+            <a:gdLst>
+              <a:gd name="connsiteX0" fmla="*/ 1371600 w 1371600"/>
+              <a:gd name="connsiteY0" fmla="*/ 711200 h 711200"/>
+              <a:gd name="connsiteX1" fmla="*/ 1371600 w 1371600"/>
+              <a:gd name="connsiteY1" fmla="*/ 0 h 711200"/>
+              <a:gd name="connsiteX2" fmla="*/ 0 w 1371600"/>
+              <a:gd name="connsiteY2" fmla="*/ 0 h 711200"/>
+            </a:gdLst>
+            <a:ahLst/>
+            <a:cxnLst>
+              <a:cxn ang="0">
+                <a:pos x="connsiteX0" y="connsiteY0"/>
+              </a:cxn>
+              <a:cxn ang="0">
+                <a:pos x="connsiteX1" y="connsiteY1"/>
+              </a:cxn>
+              <a:cxn ang="0">
+                <a:pos x="connsiteX2" y="connsiteY2"/>
+              </a:cxn>
+            </a:cxnLst>
+            <a:rect l="l" t="t" r="r" b="b"/>
+            <a:pathLst>
+              <a:path w="1371600" h="711200">
+                <a:moveTo>
+                  <a:pt x="1371600" y="711200"/>
+                </a:moveTo>
+                <a:lnTo>
+                  <a:pt x="1371600" y="0"/>
+                </a:lnTo>
+                <a:lnTo>
+                  <a:pt x="0" y="0"/>
+                </a:lnTo>
+              </a:path>
+            </a:pathLst>
+          </a:custGeom>
+          <a:noFill/>
+          <a:ln w="12700">
+            <a:solidFill>
+              <a:schemeClr val="tx2"/>
+            </a:solidFill>
+            <a:headEnd type="none" w="med" len="sm"/>
+            <a:tailEnd type="arrow" w="med" len="sm"/>
+          </a:ln>
+        </p:spPr>
+        <p:style>
+          <a:lnRef idx="2">
+            <a:schemeClr val="accent1">
+              <a:shade val="50000"/>
+            </a:schemeClr>
+          </a:lnRef>
+          <a:fillRef idx="1">
+            <a:schemeClr val="accent1"/>
+          </a:fillRef>
+          <a:effectRef idx="0">
+            <a:schemeClr val="accent1"/>
+          </a:effectRef>
+          <a:fontRef idx="minor">
+            <a:schemeClr val="lt1"/>
+          </a:fontRef>
+        </p:style>
+        <p:txBody>
+          <a:bodyPr rtlCol="0" anchor="ctr"/>
+          <a:lstStyle/>
+          <a:p>
+            <a:pPr algn="ctr"/>
+            <a:endParaRPr lang="en-US"/>
+          </a:p>
+        </p:txBody>
+      </p:sp>
     </p:spTree>
     <p:extLst>
       <p:ext uri="{BB962C8B-B14F-4D97-AF65-F5344CB8AC3E}">

</xml_diff>

<commit_message>
GitHub 3 SNS (#4)
* #3 Add support for sns and refactor

* #3 add lambda blueprint for reference

* #3 SNS updated for Lambda
</commit_message>
<xml_diff>
--- a/images/aws_architecture.pptx
+++ b/images/aws_architecture.pptx
@@ -259,7 +259,7 @@
           <a:p>
             <a:fld id="{42AC6DE8-5C89-714B-A3A1-F7E061897443}" type="datetimeFigureOut">
               <a:rPr lang="en-US" smtClean="0"/>
-              <a:t>9/7/20</a:t>
+              <a:t>9/13/20</a:t>
             </a:fld>
             <a:endParaRPr lang="en-US"/>
           </a:p>
@@ -457,7 +457,7 @@
           <a:p>
             <a:fld id="{42AC6DE8-5C89-714B-A3A1-F7E061897443}" type="datetimeFigureOut">
               <a:rPr lang="en-US" smtClean="0"/>
-              <a:t>9/7/20</a:t>
+              <a:t>9/13/20</a:t>
             </a:fld>
             <a:endParaRPr lang="en-US"/>
           </a:p>
@@ -665,7 +665,7 @@
           <a:p>
             <a:fld id="{42AC6DE8-5C89-714B-A3A1-F7E061897443}" type="datetimeFigureOut">
               <a:rPr lang="en-US" smtClean="0"/>
-              <a:t>9/7/20</a:t>
+              <a:t>9/13/20</a:t>
             </a:fld>
             <a:endParaRPr lang="en-US"/>
           </a:p>
@@ -863,7 +863,7 @@
           <a:p>
             <a:fld id="{42AC6DE8-5C89-714B-A3A1-F7E061897443}" type="datetimeFigureOut">
               <a:rPr lang="en-US" smtClean="0"/>
-              <a:t>9/7/20</a:t>
+              <a:t>9/13/20</a:t>
             </a:fld>
             <a:endParaRPr lang="en-US"/>
           </a:p>
@@ -1138,7 +1138,7 @@
           <a:p>
             <a:fld id="{42AC6DE8-5C89-714B-A3A1-F7E061897443}" type="datetimeFigureOut">
               <a:rPr lang="en-US" smtClean="0"/>
-              <a:t>9/7/20</a:t>
+              <a:t>9/13/20</a:t>
             </a:fld>
             <a:endParaRPr lang="en-US"/>
           </a:p>
@@ -1403,7 +1403,7 @@
           <a:p>
             <a:fld id="{42AC6DE8-5C89-714B-A3A1-F7E061897443}" type="datetimeFigureOut">
               <a:rPr lang="en-US" smtClean="0"/>
-              <a:t>9/7/20</a:t>
+              <a:t>9/13/20</a:t>
             </a:fld>
             <a:endParaRPr lang="en-US"/>
           </a:p>
@@ -1815,7 +1815,7 @@
           <a:p>
             <a:fld id="{42AC6DE8-5C89-714B-A3A1-F7E061897443}" type="datetimeFigureOut">
               <a:rPr lang="en-US" smtClean="0"/>
-              <a:t>9/7/20</a:t>
+              <a:t>9/13/20</a:t>
             </a:fld>
             <a:endParaRPr lang="en-US"/>
           </a:p>
@@ -1956,7 +1956,7 @@
           <a:p>
             <a:fld id="{42AC6DE8-5C89-714B-A3A1-F7E061897443}" type="datetimeFigureOut">
               <a:rPr lang="en-US" smtClean="0"/>
-              <a:t>9/7/20</a:t>
+              <a:t>9/13/20</a:t>
             </a:fld>
             <a:endParaRPr lang="en-US"/>
           </a:p>
@@ -2069,7 +2069,7 @@
           <a:p>
             <a:fld id="{42AC6DE8-5C89-714B-A3A1-F7E061897443}" type="datetimeFigureOut">
               <a:rPr lang="en-US" smtClean="0"/>
-              <a:t>9/7/20</a:t>
+              <a:t>9/13/20</a:t>
             </a:fld>
             <a:endParaRPr lang="en-US"/>
           </a:p>
@@ -2380,7 +2380,7 @@
           <a:p>
             <a:fld id="{42AC6DE8-5C89-714B-A3A1-F7E061897443}" type="datetimeFigureOut">
               <a:rPr lang="en-US" smtClean="0"/>
-              <a:t>9/7/20</a:t>
+              <a:t>9/13/20</a:t>
             </a:fld>
             <a:endParaRPr lang="en-US"/>
           </a:p>
@@ -2668,7 +2668,7 @@
           <a:p>
             <a:fld id="{42AC6DE8-5C89-714B-A3A1-F7E061897443}" type="datetimeFigureOut">
               <a:rPr lang="en-US" smtClean="0"/>
-              <a:t>9/7/20</a:t>
+              <a:t>9/13/20</a:t>
             </a:fld>
             <a:endParaRPr lang="en-US"/>
           </a:p>
@@ -2909,7 +2909,7 @@
           <a:p>
             <a:fld id="{42AC6DE8-5C89-714B-A3A1-F7E061897443}" type="datetimeFigureOut">
               <a:rPr lang="en-US" smtClean="0"/>
-              <a:t>9/7/20</a:t>
+              <a:t>9/13/20</a:t>
             </a:fld>
             <a:endParaRPr lang="en-US"/>
           </a:p>
@@ -3340,8 +3340,8 @@
         </p:nvSpPr>
         <p:spPr>
           <a:xfrm>
-            <a:off x="3650426" y="427453"/>
-            <a:ext cx="7958478" cy="6122434"/>
+            <a:off x="3319670" y="427453"/>
+            <a:ext cx="8647039" cy="6122434"/>
           </a:xfrm>
           <a:prstGeom prst="rect">
             <a:avLst/>
@@ -3418,7 +3418,7 @@
         </p:blipFill>
         <p:spPr>
           <a:xfrm>
-            <a:off x="3650425" y="427453"/>
+            <a:off x="3303584" y="427453"/>
             <a:ext cx="330200" cy="330200"/>
           </a:xfrm>
           <a:prstGeom prst="rect">
@@ -3454,7 +3454,7 @@
         </p:blipFill>
         <p:spPr>
           <a:xfrm>
-            <a:off x="5290651" y="2841548"/>
+            <a:off x="5648456" y="2841548"/>
             <a:ext cx="711200" cy="711200"/>
           </a:xfrm>
           <a:prstGeom prst="rect">
@@ -3476,7 +3476,7 @@
         </p:nvSpPr>
         <p:spPr>
           <a:xfrm>
-            <a:off x="4892975" y="3582890"/>
+            <a:off x="5250780" y="3582890"/>
             <a:ext cx="1506552" cy="307777"/>
           </a:xfrm>
           <a:prstGeom prst="rect">
@@ -3514,7 +3514,7 @@
         </p:nvSpPr>
         <p:spPr>
           <a:xfrm>
-            <a:off x="9353384" y="3582890"/>
+            <a:off x="9711189" y="3582890"/>
             <a:ext cx="2217871" cy="307777"/>
           </a:xfrm>
           <a:prstGeom prst="rect">
@@ -3581,7 +3581,7 @@
         </p:blipFill>
         <p:spPr>
           <a:xfrm>
-            <a:off x="10106719" y="2871690"/>
+            <a:off x="10464524" y="2871690"/>
             <a:ext cx="711200" cy="711200"/>
           </a:xfrm>
           <a:prstGeom prst="rect">
@@ -3603,7 +3603,7 @@
         </p:nvSpPr>
         <p:spPr>
           <a:xfrm>
-            <a:off x="8102047" y="3582890"/>
+            <a:off x="8459852" y="3582890"/>
             <a:ext cx="1371158" cy="307777"/>
           </a:xfrm>
           <a:prstGeom prst="rect">
@@ -3657,7 +3657,7 @@
         </p:blipFill>
         <p:spPr>
           <a:xfrm>
-            <a:off x="8575955" y="2992340"/>
+            <a:off x="8933760" y="2992340"/>
             <a:ext cx="469900" cy="469900"/>
           </a:xfrm>
           <a:prstGeom prst="rect">
@@ -3679,7 +3679,7 @@
         </p:nvSpPr>
         <p:spPr>
           <a:xfrm>
-            <a:off x="4537316" y="5316351"/>
+            <a:off x="4895121" y="5316351"/>
             <a:ext cx="2217871" cy="307777"/>
           </a:xfrm>
           <a:prstGeom prst="rect">
@@ -3733,7 +3733,7 @@
         </p:blipFill>
         <p:spPr>
           <a:xfrm>
-            <a:off x="5290651" y="4605151"/>
+            <a:off x="5648456" y="4605151"/>
             <a:ext cx="711200" cy="711200"/>
           </a:xfrm>
           <a:prstGeom prst="rect">
@@ -3755,7 +3755,7 @@
         </p:nvSpPr>
         <p:spPr>
           <a:xfrm>
-            <a:off x="6775853" y="5316351"/>
+            <a:off x="7133658" y="5316351"/>
             <a:ext cx="2301904" cy="307777"/>
           </a:xfrm>
           <a:prstGeom prst="rect">
@@ -3807,7 +3807,7 @@
         </p:blipFill>
         <p:spPr>
           <a:xfrm>
-            <a:off x="7571205" y="4605151"/>
+            <a:off x="7929010" y="4605151"/>
             <a:ext cx="711200" cy="711200"/>
           </a:xfrm>
           <a:prstGeom prst="rect">
@@ -3829,7 +3829,7 @@
         </p:nvSpPr>
         <p:spPr>
           <a:xfrm>
-            <a:off x="9311367" y="1644366"/>
+            <a:off x="9669172" y="1644366"/>
             <a:ext cx="2301904" cy="307777"/>
           </a:xfrm>
           <a:prstGeom prst="rect">
@@ -3881,7 +3881,7 @@
         </p:blipFill>
         <p:spPr>
           <a:xfrm>
-            <a:off x="10106719" y="935388"/>
+            <a:off x="10464524" y="935388"/>
             <a:ext cx="711200" cy="711200"/>
           </a:xfrm>
           <a:prstGeom prst="rect">
@@ -3907,7 +3907,7 @@
         </p:nvCxnSpPr>
         <p:spPr>
           <a:xfrm flipH="1">
-            <a:off x="9045855" y="3227290"/>
+            <a:off x="9403660" y="3227290"/>
             <a:ext cx="1060864" cy="0"/>
           </a:xfrm>
           <a:prstGeom prst="straightConnector1">
@@ -3954,7 +3954,7 @@
         </p:nvCxnSpPr>
         <p:spPr>
           <a:xfrm flipH="1" flipV="1">
-            <a:off x="6001851" y="3197148"/>
+            <a:off x="6359656" y="3197148"/>
             <a:ext cx="2574104" cy="30142"/>
           </a:xfrm>
           <a:prstGeom prst="straightConnector1">
@@ -3997,7 +3997,7 @@
         </p:nvSpPr>
         <p:spPr>
           <a:xfrm rot="5400000" flipH="1" flipV="1">
-            <a:off x="7050257" y="-214921"/>
+            <a:off x="7408062" y="-214921"/>
             <a:ext cx="1527521" cy="4585402"/>
           </a:xfrm>
           <a:custGeom>
@@ -4138,7 +4138,7 @@
         </p:nvSpPr>
         <p:spPr>
           <a:xfrm>
-            <a:off x="6736082" y="2332859"/>
+            <a:off x="7093887" y="2332859"/>
             <a:ext cx="2301904" cy="523220"/>
           </a:xfrm>
           <a:prstGeom prst="rect">
@@ -4190,7 +4190,7 @@
         </p:blipFill>
         <p:spPr>
           <a:xfrm>
-            <a:off x="7571205" y="1598846"/>
+            <a:off x="7929010" y="1598846"/>
             <a:ext cx="711200" cy="711200"/>
           </a:xfrm>
           <a:prstGeom prst="rect">
@@ -4212,7 +4212,7 @@
         </p:nvSpPr>
         <p:spPr>
           <a:xfrm rot="5400000" flipH="1" flipV="1">
-            <a:off x="6230890" y="1501223"/>
+            <a:off x="6588695" y="1501223"/>
             <a:ext cx="899595" cy="1781035"/>
           </a:xfrm>
           <a:custGeom>
@@ -4315,7 +4315,7 @@
         </p:blipFill>
         <p:spPr bwMode="auto">
           <a:xfrm>
-            <a:off x="1200391" y="2640701"/>
+            <a:off x="1001610" y="2640701"/>
             <a:ext cx="1913671" cy="1078124"/>
           </a:xfrm>
           <a:prstGeom prst="rect">
@@ -4351,8 +4351,8 @@
         </p:nvCxnSpPr>
         <p:spPr>
           <a:xfrm flipH="1" flipV="1">
-            <a:off x="3114062" y="3179763"/>
-            <a:ext cx="2176589" cy="17385"/>
+            <a:off x="2915281" y="3179763"/>
+            <a:ext cx="2733175" cy="17385"/>
           </a:xfrm>
           <a:prstGeom prst="straightConnector1">
             <a:avLst/>
@@ -4408,7 +4408,7 @@
         </p:blipFill>
         <p:spPr>
           <a:xfrm flipH="1">
-            <a:off x="431681" y="4639389"/>
+            <a:off x="511192" y="4639389"/>
             <a:ext cx="483586" cy="469900"/>
           </a:xfrm>
           <a:prstGeom prst="rect">
@@ -4430,7 +4430,7 @@
         </p:nvSpPr>
         <p:spPr>
           <a:xfrm>
-            <a:off x="-72544" y="5162923"/>
+            <a:off x="6967" y="5162923"/>
             <a:ext cx="1506552" cy="307777"/>
           </a:xfrm>
           <a:prstGeom prst="rect">
@@ -4466,7 +4466,7 @@
         </p:nvSpPr>
         <p:spPr>
           <a:xfrm rot="5400000" flipH="1" flipV="1">
-            <a:off x="191684" y="3630679"/>
+            <a:off x="271195" y="3630679"/>
             <a:ext cx="1492889" cy="524529"/>
           </a:xfrm>
           <a:custGeom>
@@ -4554,7 +4554,7 @@
         </p:nvSpPr>
         <p:spPr>
           <a:xfrm rot="5400000" flipH="1">
-            <a:off x="6393737" y="3036072"/>
+            <a:off x="6751542" y="3036072"/>
             <a:ext cx="1134822" cy="1920677"/>
           </a:xfrm>
           <a:custGeom>
@@ -4646,7 +4646,7 @@
         </p:nvCxnSpPr>
         <p:spPr>
           <a:xfrm>
-            <a:off x="5646251" y="3890667"/>
+            <a:off x="6004056" y="3890667"/>
             <a:ext cx="0" cy="714484"/>
           </a:xfrm>
           <a:prstGeom prst="straightConnector1">
@@ -4689,7 +4689,7 @@
         </p:nvSpPr>
         <p:spPr>
           <a:xfrm>
-            <a:off x="9364802" y="5316351"/>
+            <a:off x="9722607" y="5316351"/>
             <a:ext cx="2301904" cy="307777"/>
           </a:xfrm>
           <a:prstGeom prst="rect">
@@ -4739,7 +4739,7 @@
         </p:blipFill>
         <p:spPr>
           <a:xfrm>
-            <a:off x="10160154" y="4605151"/>
+            <a:off x="10517959" y="4605151"/>
             <a:ext cx="711200" cy="711200"/>
           </a:xfrm>
           <a:prstGeom prst="rect">
@@ -4747,6 +4747,170 @@
           </a:prstGeom>
         </p:spPr>
       </p:pic>
+      <p:sp>
+        <p:nvSpPr>
+          <p:cNvPr id="34" name="TextBox 33">
+            <a:extLst>
+              <a:ext uri="{FF2B5EF4-FFF2-40B4-BE49-F238E27FC236}">
+                <a16:creationId xmlns:a16="http://schemas.microsoft.com/office/drawing/2014/main" id="{B8E4948A-5EFB-F84B-907D-A79A0F9393B9}"/>
+              </a:ext>
+            </a:extLst>
+          </p:cNvPr>
+          <p:cNvSpPr txBox="1"/>
+          <p:nvPr/>
+        </p:nvSpPr>
+        <p:spPr>
+          <a:xfrm>
+            <a:off x="3351488" y="2291512"/>
+            <a:ext cx="2217871" cy="523220"/>
+          </a:xfrm>
+          <a:prstGeom prst="rect">
+            <a:avLst/>
+          </a:prstGeom>
+          <a:noFill/>
+        </p:spPr>
+        <p:txBody>
+          <a:bodyPr wrap="square" rtlCol="0">
+            <a:spAutoFit/>
+          </a:bodyPr>
+          <a:lstStyle/>
+          <a:p>
+            <a:pPr algn="ctr"/>
+            <a:r>
+              <a:rPr lang="en-US" sz="1400" dirty="0">
+                <a:latin typeface="+mj-lt"/>
+                <a:ea typeface="Amazon Ember" panose="020B0603020204020204" pitchFamily="34" charset="0"/>
+                <a:cs typeface="Amazon Ember" panose="020B0603020204020204" pitchFamily="34" charset="0"/>
+              </a:rPr>
+              <a:t>Amazon Simple Notification Service</a:t>
+            </a:r>
+          </a:p>
+        </p:txBody>
+      </p:sp>
+      <p:pic>
+        <p:nvPicPr>
+          <p:cNvPr id="40" name="Graphic 39">
+            <a:extLst>
+              <a:ext uri="{FF2B5EF4-FFF2-40B4-BE49-F238E27FC236}">
+                <a16:creationId xmlns:a16="http://schemas.microsoft.com/office/drawing/2014/main" id="{F3E9489A-346F-AC4C-98D6-824CAAD7F1D4}"/>
+              </a:ext>
+            </a:extLst>
+          </p:cNvPr>
+          <p:cNvPicPr>
+            <a:picLocks noChangeAspect="1"/>
+          </p:cNvPicPr>
+          <p:nvPr/>
+        </p:nvPicPr>
+        <p:blipFill>
+          <a:blip r:embed="rId23">
+            <a:extLst>
+              <a:ext uri="{96DAC541-7B7A-43D3-8B79-37D633B846F1}">
+                <asvg:svgBlip xmlns:asvg="http://schemas.microsoft.com/office/drawing/2016/SVG/main" r:embed="rId24"/>
+              </a:ext>
+            </a:extLst>
+          </a:blip>
+          <a:stretch>
+            <a:fillRect/>
+          </a:stretch>
+        </p:blipFill>
+        <p:spPr>
+          <a:xfrm>
+            <a:off x="4111015" y="1596543"/>
+            <a:ext cx="711200" cy="711200"/>
+          </a:xfrm>
+          <a:prstGeom prst="rect">
+            <a:avLst/>
+          </a:prstGeom>
+        </p:spPr>
+      </p:pic>
+      <p:sp>
+        <p:nvSpPr>
+          <p:cNvPr id="47" name="Freeform 46">
+            <a:extLst>
+              <a:ext uri="{FF2B5EF4-FFF2-40B4-BE49-F238E27FC236}">
+                <a16:creationId xmlns:a16="http://schemas.microsoft.com/office/drawing/2014/main" id="{5B25CE66-1EFB-0B4F-B331-4A11545960FA}"/>
+              </a:ext>
+            </a:extLst>
+          </p:cNvPr>
+          <p:cNvSpPr/>
+          <p:nvPr/>
+        </p:nvSpPr>
+        <p:spPr>
+          <a:xfrm rot="10800000" flipH="1" flipV="1">
+            <a:off x="4810388" y="1952143"/>
+            <a:ext cx="940563" cy="889396"/>
+          </a:xfrm>
+          <a:custGeom>
+            <a:avLst/>
+            <a:gdLst>
+              <a:gd name="connsiteX0" fmla="*/ 1371600 w 1371600"/>
+              <a:gd name="connsiteY0" fmla="*/ 711200 h 711200"/>
+              <a:gd name="connsiteX1" fmla="*/ 1371600 w 1371600"/>
+              <a:gd name="connsiteY1" fmla="*/ 0 h 711200"/>
+              <a:gd name="connsiteX2" fmla="*/ 0 w 1371600"/>
+              <a:gd name="connsiteY2" fmla="*/ 0 h 711200"/>
+            </a:gdLst>
+            <a:ahLst/>
+            <a:cxnLst>
+              <a:cxn ang="0">
+                <a:pos x="connsiteX0" y="connsiteY0"/>
+              </a:cxn>
+              <a:cxn ang="0">
+                <a:pos x="connsiteX1" y="connsiteY1"/>
+              </a:cxn>
+              <a:cxn ang="0">
+                <a:pos x="connsiteX2" y="connsiteY2"/>
+              </a:cxn>
+            </a:cxnLst>
+            <a:rect l="l" t="t" r="r" b="b"/>
+            <a:pathLst>
+              <a:path w="1371600" h="711200">
+                <a:moveTo>
+                  <a:pt x="1371600" y="711200"/>
+                </a:moveTo>
+                <a:lnTo>
+                  <a:pt x="1371600" y="0"/>
+                </a:lnTo>
+                <a:lnTo>
+                  <a:pt x="0" y="0"/>
+                </a:lnTo>
+              </a:path>
+            </a:pathLst>
+          </a:custGeom>
+          <a:noFill/>
+          <a:ln w="12700">
+            <a:solidFill>
+              <a:schemeClr val="tx2"/>
+            </a:solidFill>
+            <a:headEnd type="none" w="med" len="sm"/>
+            <a:tailEnd type="arrow" w="med" len="sm"/>
+          </a:ln>
+        </p:spPr>
+        <p:style>
+          <a:lnRef idx="2">
+            <a:schemeClr val="accent1">
+              <a:shade val="50000"/>
+            </a:schemeClr>
+          </a:lnRef>
+          <a:fillRef idx="1">
+            <a:schemeClr val="accent1"/>
+          </a:fillRef>
+          <a:effectRef idx="0">
+            <a:schemeClr val="accent1"/>
+          </a:effectRef>
+          <a:fontRef idx="minor">
+            <a:schemeClr val="lt1"/>
+          </a:fontRef>
+        </p:style>
+        <p:txBody>
+          <a:bodyPr rtlCol="0" anchor="ctr"/>
+          <a:lstStyle/>
+          <a:p>
+            <a:pPr algn="ctr"/>
+            <a:endParaRPr lang="en-US"/>
+          </a:p>
+        </p:txBody>
+      </p:sp>
     </p:spTree>
     <p:extLst>
       <p:ext uri="{BB962C8B-B14F-4D97-AF65-F5344CB8AC3E}">

</xml_diff>